<commit_message>
finished branching strategy (advanced)
</commit_message>
<xml_diff>
--- a/Branching Strategy (Advanced).pptx
+++ b/Branching Strategy (Advanced).pptx
@@ -10,7 +10,9 @@
     <p:sldId id="258" r:id="rId4"/>
     <p:sldId id="259" r:id="rId5"/>
     <p:sldId id="260" r:id="rId6"/>
-    <p:sldId id="261" r:id="rId7"/>
+    <p:sldId id="262" r:id="rId7"/>
+    <p:sldId id="261" r:id="rId8"/>
+    <p:sldId id="263" r:id="rId9"/>
   </p:sldIdLst>
   <p:sldSz cx="9144000" cy="6858000" type="screen4x3"/>
   <p:notesSz cx="6858000" cy="9144000"/>
@@ -293,7 +295,7 @@
           <a:p>
             <a:fld id="{8839E6B8-AE44-4E4D-B3CE-5639A35B70C6}" type="datetimeFigureOut">
               <a:rPr lang="en-SG" smtClean="0"/>
-              <a:t>4/4/2013</a:t>
+              <a:t>8/4/2013</a:t>
             </a:fld>
             <a:endParaRPr lang="en-SG"/>
           </a:p>
@@ -463,7 +465,7 @@
           <a:p>
             <a:fld id="{8839E6B8-AE44-4E4D-B3CE-5639A35B70C6}" type="datetimeFigureOut">
               <a:rPr lang="en-SG" smtClean="0"/>
-              <a:t>4/4/2013</a:t>
+              <a:t>8/4/2013</a:t>
             </a:fld>
             <a:endParaRPr lang="en-SG"/>
           </a:p>
@@ -643,7 +645,7 @@
           <a:p>
             <a:fld id="{8839E6B8-AE44-4E4D-B3CE-5639A35B70C6}" type="datetimeFigureOut">
               <a:rPr lang="en-SG" smtClean="0"/>
-              <a:t>4/4/2013</a:t>
+              <a:t>8/4/2013</a:t>
             </a:fld>
             <a:endParaRPr lang="en-SG"/>
           </a:p>
@@ -813,7 +815,7 @@
           <a:p>
             <a:fld id="{8839E6B8-AE44-4E4D-B3CE-5639A35B70C6}" type="datetimeFigureOut">
               <a:rPr lang="en-SG" smtClean="0"/>
-              <a:t>4/4/2013</a:t>
+              <a:t>8/4/2013</a:t>
             </a:fld>
             <a:endParaRPr lang="en-SG"/>
           </a:p>
@@ -1059,7 +1061,7 @@
           <a:p>
             <a:fld id="{8839E6B8-AE44-4E4D-B3CE-5639A35B70C6}" type="datetimeFigureOut">
               <a:rPr lang="en-SG" smtClean="0"/>
-              <a:t>4/4/2013</a:t>
+              <a:t>8/4/2013</a:t>
             </a:fld>
             <a:endParaRPr lang="en-SG"/>
           </a:p>
@@ -1347,7 +1349,7 @@
           <a:p>
             <a:fld id="{8839E6B8-AE44-4E4D-B3CE-5639A35B70C6}" type="datetimeFigureOut">
               <a:rPr lang="en-SG" smtClean="0"/>
-              <a:t>4/4/2013</a:t>
+              <a:t>8/4/2013</a:t>
             </a:fld>
             <a:endParaRPr lang="en-SG"/>
           </a:p>
@@ -1769,7 +1771,7 @@
           <a:p>
             <a:fld id="{8839E6B8-AE44-4E4D-B3CE-5639A35B70C6}" type="datetimeFigureOut">
               <a:rPr lang="en-SG" smtClean="0"/>
-              <a:t>4/4/2013</a:t>
+              <a:t>8/4/2013</a:t>
             </a:fld>
             <a:endParaRPr lang="en-SG"/>
           </a:p>
@@ -1887,7 +1889,7 @@
           <a:p>
             <a:fld id="{8839E6B8-AE44-4E4D-B3CE-5639A35B70C6}" type="datetimeFigureOut">
               <a:rPr lang="en-SG" smtClean="0"/>
-              <a:t>4/4/2013</a:t>
+              <a:t>8/4/2013</a:t>
             </a:fld>
             <a:endParaRPr lang="en-SG"/>
           </a:p>
@@ -1982,7 +1984,7 @@
           <a:p>
             <a:fld id="{8839E6B8-AE44-4E4D-B3CE-5639A35B70C6}" type="datetimeFigureOut">
               <a:rPr lang="en-SG" smtClean="0"/>
-              <a:t>4/4/2013</a:t>
+              <a:t>8/4/2013</a:t>
             </a:fld>
             <a:endParaRPr lang="en-SG"/>
           </a:p>
@@ -2259,7 +2261,7 @@
           <a:p>
             <a:fld id="{8839E6B8-AE44-4E4D-B3CE-5639A35B70C6}" type="datetimeFigureOut">
               <a:rPr lang="en-SG" smtClean="0"/>
-              <a:t>4/4/2013</a:t>
+              <a:t>8/4/2013</a:t>
             </a:fld>
             <a:endParaRPr lang="en-SG"/>
           </a:p>
@@ -2512,7 +2514,7 @@
           <a:p>
             <a:fld id="{8839E6B8-AE44-4E4D-B3CE-5639A35B70C6}" type="datetimeFigureOut">
               <a:rPr lang="en-SG" smtClean="0"/>
-              <a:t>4/4/2013</a:t>
+              <a:t>8/4/2013</a:t>
             </a:fld>
             <a:endParaRPr lang="en-SG"/>
           </a:p>
@@ -2725,7 +2727,7 @@
           <a:p>
             <a:fld id="{8839E6B8-AE44-4E4D-B3CE-5639A35B70C6}" type="datetimeFigureOut">
               <a:rPr lang="en-SG" smtClean="0"/>
-              <a:t>4/4/2013</a:t>
+              <a:t>8/4/2013</a:t>
             </a:fld>
             <a:endParaRPr lang="en-SG"/>
           </a:p>
@@ -3140,7 +3142,7 @@
           <a:p>
             <a:r>
               <a:rPr lang="en-US" dirty="0" smtClean="0"/>
-              <a:t>Strategies to apply for different projects</a:t>
+              <a:t>Branching Strategy for big teams</a:t>
             </a:r>
             <a:endParaRPr lang="en-SG" dirty="0"/>
           </a:p>
@@ -3199,7 +3201,7 @@
           <a:lstStyle/>
           <a:p>
             <a:r>
-              <a:rPr lang="en-US"/>
+              <a:rPr lang="en-US" dirty="0"/>
               <a:t>Branching Strategy (Advanced)</a:t>
             </a:r>
             <a:endParaRPr lang="en-SG" dirty="0"/>
@@ -3228,15 +3230,24 @@
             </a:pPr>
             <a:r>
               <a:rPr lang="en-US" dirty="0" smtClean="0"/>
-              <a:t>In this section, we'll cover branching strategy in big </a:t>
-            </a:r>
+              <a:t>In this section, we'll cover branching strategy in big teams. Since this is an advanced section we'll assume you've read Branches, Tags and Versioning and Branching Strategy (Basic). If you have not done so, please go read them now.</a:t>
+            </a:r>
+          </a:p>
+          <a:p>
+            <a:pPr marL="0" indent="0">
+              <a:buNone/>
+            </a:pPr>
             <a:r>
               <a:rPr lang="en-US" dirty="0" smtClean="0"/>
-              <a:t>teams. Since this is an advanced sectio</a:t>
+              <a:t>This section will serve as a guide to using </a:t>
+            </a:r>
+            <a:r>
+              <a:rPr lang="en-US" dirty="0" err="1" smtClean="0"/>
+              <a:t>git</a:t>
             </a:r>
             <a:r>
               <a:rPr lang="en-US" dirty="0" smtClean="0"/>
-              <a:t>n we'll assume you've read the Branches, Tags and Versioning and Branching Strategy (Basic). If you have not done so, please go read them now.</a:t>
+              <a:t> in teams with 5 or more people.</a:t>
             </a:r>
             <a:endParaRPr lang="en-SG" dirty="0"/>
           </a:p>
@@ -3294,7 +3305,11 @@
           <a:bodyPr/>
           <a:lstStyle/>
           <a:p>
-            <a:endParaRPr lang="en-SG"/>
+            <a:r>
+              <a:rPr lang="en-US" dirty="0"/>
+              <a:t>Branching Strategy (Advanced)</a:t>
+            </a:r>
+            <a:endParaRPr lang="en-SG" dirty="0"/>
           </a:p>
         </p:txBody>
       </p:sp>
@@ -3313,7 +3328,14 @@
           <a:bodyPr/>
           <a:lstStyle/>
           <a:p>
-            <a:endParaRPr lang="en-SG"/>
+            <a:pPr marL="0" indent="0">
+              <a:buNone/>
+            </a:pPr>
+            <a:r>
+              <a:rPr lang="en-US" dirty="0" smtClean="0"/>
+              <a:t>When you start working in a large team, things get complicated. Your team members are working on different things than you are, so if you constantly push and pull code from the same branch, you might end up with many conflict errors that need to be resolved immediately. This takes up precious time, so this strategy is employed to reduce that.</a:t>
+            </a:r>
+            <a:endParaRPr lang="en-SG" dirty="0"/>
           </a:p>
         </p:txBody>
       </p:sp>
@@ -3327,6 +3349,13 @@
   <p:clrMapOvr>
     <a:masterClrMapping/>
   </p:clrMapOvr>
+  <p:timing>
+    <p:tnLst>
+      <p:par>
+        <p:cTn id="1" dur="indefinite" restart="never" nodeType="tmRoot"/>
+      </p:par>
+    </p:tnLst>
+  </p:timing>
 </p:sld>
 </file>
 
@@ -3362,7 +3391,11 @@
           <a:bodyPr/>
           <a:lstStyle/>
           <a:p>
-            <a:endParaRPr lang="en-SG"/>
+            <a:r>
+              <a:rPr lang="en-US" dirty="0"/>
+              <a:t>Branching Strategy (Advanced)</a:t>
+            </a:r>
+            <a:endParaRPr lang="en-SG" dirty="0"/>
           </a:p>
         </p:txBody>
       </p:sp>
@@ -3381,7 +3414,14 @@
           <a:bodyPr/>
           <a:lstStyle/>
           <a:p>
-            <a:endParaRPr lang="en-SG"/>
+            <a:pPr marL="0" indent="0">
+              <a:buNone/>
+            </a:pPr>
+            <a:r>
+              <a:rPr lang="en-US" dirty="0" smtClean="0"/>
+              <a:t>First of, you start with a master and develop branch as usual. Then, for each feature of the project, you create a branch, typically named after that feature, e.g. login branch. Remember that all feature branches should branch off from the develop branch. This allow members to jump from branch to branch, so that they can work on different features without risking the other feature's code. </a:t>
+            </a:r>
+            <a:endParaRPr lang="en-SG" dirty="0"/>
           </a:p>
         </p:txBody>
       </p:sp>
@@ -3395,6 +3435,13 @@
   <p:clrMapOvr>
     <a:masterClrMapping/>
   </p:clrMapOvr>
+  <p:timing>
+    <p:tnLst>
+      <p:par>
+        <p:cTn id="1" dur="indefinite" restart="never" nodeType="tmRoot"/>
+      </p:par>
+    </p:tnLst>
+  </p:timing>
 </p:sld>
 </file>
 
@@ -3430,7 +3477,11 @@
           <a:bodyPr/>
           <a:lstStyle/>
           <a:p>
-            <a:endParaRPr lang="en-SG"/>
+            <a:r>
+              <a:rPr lang="en-US" dirty="0"/>
+              <a:t>Branching Strategy (Advanced)</a:t>
+            </a:r>
+            <a:endParaRPr lang="en-SG" dirty="0"/>
           </a:p>
         </p:txBody>
       </p:sp>
@@ -3449,7 +3500,14 @@
           <a:bodyPr/>
           <a:lstStyle/>
           <a:p>
-            <a:endParaRPr lang="en-SG"/>
+            <a:pPr marL="0" indent="0">
+              <a:buNone/>
+            </a:pPr>
+            <a:r>
+              <a:rPr lang="en-US" dirty="0" smtClean="0"/>
+              <a:t>Once a feature is complete, it is merged into the develop branch. Usually, only one person is tasked with handling all merges across all branches (we'll get to all the different type of branches and how they merge later). He also fixes any and all merge conflicts. Since only one person is allowed to do merges, the rest of the team is able to focus on actually developing the code.</a:t>
+            </a:r>
+            <a:endParaRPr lang="en-SG" dirty="0"/>
           </a:p>
         </p:txBody>
       </p:sp>
@@ -3463,6 +3521,13 @@
   <p:clrMapOvr>
     <a:masterClrMapping/>
   </p:clrMapOvr>
+  <p:timing>
+    <p:tnLst>
+      <p:par>
+        <p:cTn id="1" dur="indefinite" restart="never" nodeType="tmRoot"/>
+      </p:par>
+    </p:tnLst>
+  </p:timing>
 </p:sld>
 </file>
 
@@ -3498,7 +3563,11 @@
           <a:bodyPr/>
           <a:lstStyle/>
           <a:p>
-            <a:endParaRPr lang="en-SG"/>
+            <a:r>
+              <a:rPr lang="en-US" dirty="0"/>
+              <a:t>Branching Strategy (Advanced)</a:t>
+            </a:r>
+            <a:endParaRPr lang="en-SG" dirty="0"/>
           </a:p>
         </p:txBody>
       </p:sp>
@@ -3517,7 +3586,107 @@
           <a:bodyPr/>
           <a:lstStyle/>
           <a:p>
-            <a:endParaRPr lang="en-SG"/>
+            <a:pPr marL="0" indent="0">
+              <a:buNone/>
+            </a:pPr>
+            <a:r>
+              <a:rPr lang="en-US" dirty="0" smtClean="0"/>
+              <a:t>The next branch you might want to add is the release branch. This branches off from the develop branch, and controls the release of new features, once all the conflict issues are fixed in the develop branch. The release branch also is used for minor bug fixes.</a:t>
+            </a:r>
+            <a:endParaRPr lang="en-SG" dirty="0"/>
+          </a:p>
+        </p:txBody>
+      </p:sp>
+    </p:spTree>
+    <p:extLst>
+      <p:ext uri="{BB962C8B-B14F-4D97-AF65-F5344CB8AC3E}">
+        <p14:creationId xmlns:p14="http://schemas.microsoft.com/office/powerpoint/2010/main" val="3202192967"/>
+      </p:ext>
+    </p:extLst>
+  </p:cSld>
+  <p:clrMapOvr>
+    <a:masterClrMapping/>
+  </p:clrMapOvr>
+  <p:timing>
+    <p:tnLst>
+      <p:par>
+        <p:cTn id="1" dur="indefinite" restart="never" nodeType="tmRoot"/>
+      </p:par>
+    </p:tnLst>
+  </p:timing>
+</p:sld>
+</file>
+
+<file path=ppt/slides/slide7.xml><?xml version="1.0" encoding="utf-8"?>
+<p:sld xmlns:a="http://schemas.openxmlformats.org/drawingml/2006/main" xmlns:r="http://schemas.openxmlformats.org/officeDocument/2006/relationships" xmlns:p="http://schemas.openxmlformats.org/presentationml/2006/main">
+  <p:cSld>
+    <p:spTree>
+      <p:nvGrpSpPr>
+        <p:cNvPr id="1" name=""/>
+        <p:cNvGrpSpPr/>
+        <p:nvPr/>
+      </p:nvGrpSpPr>
+      <p:grpSpPr>
+        <a:xfrm>
+          <a:off x="0" y="0"/>
+          <a:ext cx="0" cy="0"/>
+          <a:chOff x="0" y="0"/>
+          <a:chExt cx="0" cy="0"/>
+        </a:xfrm>
+      </p:grpSpPr>
+      <p:sp>
+        <p:nvSpPr>
+          <p:cNvPr id="2" name="Title 1"/>
+          <p:cNvSpPr>
+            <a:spLocks noGrp="1"/>
+          </p:cNvSpPr>
+          <p:nvPr>
+            <p:ph type="title"/>
+          </p:nvPr>
+        </p:nvSpPr>
+        <p:spPr/>
+        <p:txBody>
+          <a:bodyPr/>
+          <a:lstStyle/>
+          <a:p>
+            <a:r>
+              <a:rPr lang="en-US" dirty="0"/>
+              <a:t>Branching Strategy (Advanced)</a:t>
+            </a:r>
+            <a:endParaRPr lang="en-SG" dirty="0"/>
+          </a:p>
+        </p:txBody>
+      </p:sp>
+      <p:sp>
+        <p:nvSpPr>
+          <p:cNvPr id="3" name="Content Placeholder 2"/>
+          <p:cNvSpPr>
+            <a:spLocks noGrp="1"/>
+          </p:cNvSpPr>
+          <p:nvPr>
+            <p:ph idx="1"/>
+          </p:nvPr>
+        </p:nvSpPr>
+        <p:spPr>
+          <a:xfrm>
+            <a:off x="457200" y="1600200"/>
+            <a:ext cx="8229600" cy="4997152"/>
+          </a:xfrm>
+        </p:spPr>
+        <p:txBody>
+          <a:bodyPr>
+            <a:normAutofit/>
+          </a:bodyPr>
+          <a:lstStyle/>
+          <a:p>
+            <a:pPr marL="0" indent="0">
+              <a:buNone/>
+            </a:pPr>
+            <a:r>
+              <a:rPr lang="en-US" dirty="0" smtClean="0"/>
+              <a:t>So right now, we have Master, Develop, Feature and Release branches. Another optional branch is the hotfix branch. Sometimes your project is in a state where there is a problem that needs to be immediately addressed instead of being fixed in the next patch. This is when you can create a hotfix branch the branches from the master specifically to fix that problem. Once the problem is fixed, it merges back to the master or develop branch.</a:t>
+            </a:r>
+            <a:endParaRPr lang="en-SG" dirty="0"/>
           </a:p>
         </p:txBody>
       </p:sp>
@@ -3531,6 +3700,92 @@
   <p:clrMapOvr>
     <a:masterClrMapping/>
   </p:clrMapOvr>
+  <p:timing>
+    <p:tnLst>
+      <p:par>
+        <p:cTn id="1" dur="indefinite" restart="never" nodeType="tmRoot"/>
+      </p:par>
+    </p:tnLst>
+  </p:timing>
+</p:sld>
+</file>
+
+<file path=ppt/slides/slide8.xml><?xml version="1.0" encoding="utf-8"?>
+<p:sld xmlns:a="http://schemas.openxmlformats.org/drawingml/2006/main" xmlns:r="http://schemas.openxmlformats.org/officeDocument/2006/relationships" xmlns:p="http://schemas.openxmlformats.org/presentationml/2006/main">
+  <p:cSld>
+    <p:spTree>
+      <p:nvGrpSpPr>
+        <p:cNvPr id="1" name=""/>
+        <p:cNvGrpSpPr/>
+        <p:nvPr/>
+      </p:nvGrpSpPr>
+      <p:grpSpPr>
+        <a:xfrm>
+          <a:off x="0" y="0"/>
+          <a:ext cx="0" cy="0"/>
+          <a:chOff x="0" y="0"/>
+          <a:chExt cx="0" cy="0"/>
+        </a:xfrm>
+      </p:grpSpPr>
+      <p:sp>
+        <p:nvSpPr>
+          <p:cNvPr id="2" name="Title 1"/>
+          <p:cNvSpPr>
+            <a:spLocks noGrp="1"/>
+          </p:cNvSpPr>
+          <p:nvPr>
+            <p:ph type="title"/>
+          </p:nvPr>
+        </p:nvSpPr>
+        <p:spPr/>
+        <p:txBody>
+          <a:bodyPr/>
+          <a:lstStyle/>
+          <a:p>
+            <a:r>
+              <a:rPr lang="en-US" dirty="0"/>
+              <a:t>Branching Strategy (Advanced)</a:t>
+            </a:r>
+            <a:endParaRPr lang="en-SG" dirty="0"/>
+          </a:p>
+        </p:txBody>
+      </p:sp>
+      <p:sp>
+        <p:nvSpPr>
+          <p:cNvPr id="3" name="Content Placeholder 2"/>
+          <p:cNvSpPr>
+            <a:spLocks noGrp="1"/>
+          </p:cNvSpPr>
+          <p:nvPr>
+            <p:ph idx="1"/>
+          </p:nvPr>
+        </p:nvSpPr>
+        <p:spPr/>
+        <p:txBody>
+          <a:bodyPr/>
+          <a:lstStyle/>
+          <a:p>
+            <a:endParaRPr lang="en-SG"/>
+          </a:p>
+        </p:txBody>
+      </p:sp>
+    </p:spTree>
+    <p:extLst>
+      <p:ext uri="{BB962C8B-B14F-4D97-AF65-F5344CB8AC3E}">
+        <p14:creationId xmlns:p14="http://schemas.microsoft.com/office/powerpoint/2010/main" val="2446357748"/>
+      </p:ext>
+    </p:extLst>
+  </p:cSld>
+  <p:clrMapOvr>
+    <a:masterClrMapping/>
+  </p:clrMapOvr>
+  <p:timing>
+    <p:tnLst>
+      <p:par>
+        <p:cTn id="1" dur="indefinite" restart="never" nodeType="tmRoot"/>
+      </p:par>
+    </p:tnLst>
+  </p:timing>
 </p:sld>
 </file>
 

</xml_diff>

<commit_message>
added example walkthrough for Advanced Branching Strat
</commit_message>
<xml_diff>
--- a/Branching Strategy (Advanced).pptx
+++ b/Branching Strategy (Advanced).pptx
@@ -13,6 +13,11 @@
     <p:sldId id="262" r:id="rId7"/>
     <p:sldId id="261" r:id="rId8"/>
     <p:sldId id="263" r:id="rId9"/>
+    <p:sldId id="264" r:id="rId10"/>
+    <p:sldId id="265" r:id="rId11"/>
+    <p:sldId id="266" r:id="rId12"/>
+    <p:sldId id="267" r:id="rId13"/>
+    <p:sldId id="268" r:id="rId14"/>
   </p:sldIdLst>
   <p:sldSz cx="9144000" cy="6858000" type="screen4x3"/>
   <p:notesSz cx="6858000" cy="9144000"/>
@@ -3168,6 +3173,378 @@
 </p:sld>
 </file>
 
+<file path=ppt/slides/slide10.xml><?xml version="1.0" encoding="utf-8"?>
+<p:sld xmlns:a="http://schemas.openxmlformats.org/drawingml/2006/main" xmlns:r="http://schemas.openxmlformats.org/officeDocument/2006/relationships" xmlns:p="http://schemas.openxmlformats.org/presentationml/2006/main">
+  <p:cSld>
+    <p:spTree>
+      <p:nvGrpSpPr>
+        <p:cNvPr id="1" name=""/>
+        <p:cNvGrpSpPr/>
+        <p:nvPr/>
+      </p:nvGrpSpPr>
+      <p:grpSpPr>
+        <a:xfrm>
+          <a:off x="0" y="0"/>
+          <a:ext cx="0" cy="0"/>
+          <a:chOff x="0" y="0"/>
+          <a:chExt cx="0" cy="0"/>
+        </a:xfrm>
+      </p:grpSpPr>
+      <p:sp>
+        <p:nvSpPr>
+          <p:cNvPr id="2" name="Title 1"/>
+          <p:cNvSpPr>
+            <a:spLocks noGrp="1"/>
+          </p:cNvSpPr>
+          <p:nvPr>
+            <p:ph type="title"/>
+          </p:nvPr>
+        </p:nvSpPr>
+        <p:spPr/>
+        <p:txBody>
+          <a:bodyPr/>
+          <a:lstStyle/>
+          <a:p>
+            <a:r>
+              <a:rPr lang="en-US" dirty="0"/>
+              <a:t>Branching Strategy (Advanced)</a:t>
+            </a:r>
+            <a:endParaRPr lang="en-SG" dirty="0"/>
+          </a:p>
+        </p:txBody>
+      </p:sp>
+      <p:sp>
+        <p:nvSpPr>
+          <p:cNvPr id="3" name="Content Placeholder 2"/>
+          <p:cNvSpPr>
+            <a:spLocks noGrp="1"/>
+          </p:cNvSpPr>
+          <p:nvPr>
+            <p:ph idx="1"/>
+          </p:nvPr>
+        </p:nvSpPr>
+        <p:spPr>
+          <a:xfrm>
+            <a:off x="457200" y="1600200"/>
+            <a:ext cx="8229600" cy="5141168"/>
+          </a:xfrm>
+        </p:spPr>
+        <p:txBody>
+          <a:bodyPr/>
+          <a:lstStyle/>
+          <a:p>
+            <a:pPr marL="0" indent="0">
+              <a:buNone/>
+            </a:pPr>
+            <a:r>
+              <a:rPr lang="en-US" dirty="0" smtClean="0"/>
+              <a:t>One guy is assigned to do merging and bug fixing. So now whenever a feature is finished, he'll merge the feature branch into the develop branch and fix any conflicts, while the programmer of the feature can start working on the next feature. You've finished the login function and handed it over to be merged. </a:t>
+            </a:r>
+            <a:r>
+              <a:rPr lang="en-US" dirty="0" smtClean="0"/>
+              <a:t>By now, your website has enough functions to serve as a nice little website, and so a release branch is branched off from the develop branch.</a:t>
+            </a:r>
+            <a:endParaRPr lang="en-SG" dirty="0"/>
+          </a:p>
+        </p:txBody>
+      </p:sp>
+    </p:spTree>
+    <p:extLst>
+      <p:ext uri="{BB962C8B-B14F-4D97-AF65-F5344CB8AC3E}">
+        <p14:creationId xmlns:p14="http://schemas.microsoft.com/office/powerpoint/2010/main" val="2490241320"/>
+      </p:ext>
+    </p:extLst>
+  </p:cSld>
+  <p:clrMapOvr>
+    <a:masterClrMapping/>
+  </p:clrMapOvr>
+  <p:timing>
+    <p:tnLst>
+      <p:par>
+        <p:cTn id="1" dur="indefinite" restart="never" nodeType="tmRoot"/>
+      </p:par>
+    </p:tnLst>
+  </p:timing>
+</p:sld>
+</file>
+
+<file path=ppt/slides/slide11.xml><?xml version="1.0" encoding="utf-8"?>
+<p:sld xmlns:a="http://schemas.openxmlformats.org/drawingml/2006/main" xmlns:r="http://schemas.openxmlformats.org/officeDocument/2006/relationships" xmlns:p="http://schemas.openxmlformats.org/presentationml/2006/main">
+  <p:cSld>
+    <p:spTree>
+      <p:nvGrpSpPr>
+        <p:cNvPr id="1" name=""/>
+        <p:cNvGrpSpPr/>
+        <p:nvPr/>
+      </p:nvGrpSpPr>
+      <p:grpSpPr>
+        <a:xfrm>
+          <a:off x="0" y="0"/>
+          <a:ext cx="0" cy="0"/>
+          <a:chOff x="0" y="0"/>
+          <a:chExt cx="0" cy="0"/>
+        </a:xfrm>
+      </p:grpSpPr>
+      <p:sp>
+        <p:nvSpPr>
+          <p:cNvPr id="2" name="Title 1"/>
+          <p:cNvSpPr>
+            <a:spLocks noGrp="1"/>
+          </p:cNvSpPr>
+          <p:nvPr>
+            <p:ph type="title"/>
+          </p:nvPr>
+        </p:nvSpPr>
+        <p:spPr/>
+        <p:txBody>
+          <a:bodyPr/>
+          <a:lstStyle/>
+          <a:p>
+            <a:r>
+              <a:rPr lang="en-US" dirty="0"/>
+              <a:t>Branching Strategy (Advanced)</a:t>
+            </a:r>
+            <a:endParaRPr lang="en-SG" dirty="0"/>
+          </a:p>
+        </p:txBody>
+      </p:sp>
+      <p:sp>
+        <p:nvSpPr>
+          <p:cNvPr id="3" name="Content Placeholder 2"/>
+          <p:cNvSpPr>
+            <a:spLocks noGrp="1"/>
+          </p:cNvSpPr>
+          <p:nvPr>
+            <p:ph idx="1"/>
+          </p:nvPr>
+        </p:nvSpPr>
+        <p:spPr>
+          <a:xfrm>
+            <a:off x="457200" y="1600200"/>
+            <a:ext cx="8229600" cy="5141168"/>
+          </a:xfrm>
+        </p:spPr>
+        <p:txBody>
+          <a:bodyPr>
+            <a:normAutofit lnSpcReduction="10000"/>
+          </a:bodyPr>
+          <a:lstStyle/>
+          <a:p>
+            <a:pPr marL="0" indent="0">
+              <a:buNone/>
+            </a:pPr>
+            <a:r>
+              <a:rPr lang="en-US" dirty="0" smtClean="0"/>
+              <a:t>Now released, you discover some minor bugs. The bugs are fixed on the develop branch, and are merged to the release branch during the next patch update. Suddenly you discover you made a major mistake with the login feature: you forgot to add the login button! Since this is a major problem, you need to fix it right away. As such, you branch off a new branch from the develop, called hotfix-login. You create the button, and hand it over to be merged back to the develop branc</a:t>
+            </a:r>
+            <a:r>
+              <a:rPr lang="en-US" dirty="0" smtClean="0"/>
+              <a:t>h before being released.</a:t>
+            </a:r>
+            <a:endParaRPr lang="en-SG" dirty="0"/>
+          </a:p>
+        </p:txBody>
+      </p:sp>
+    </p:spTree>
+    <p:extLst>
+      <p:ext uri="{BB962C8B-B14F-4D97-AF65-F5344CB8AC3E}">
+        <p14:creationId xmlns:p14="http://schemas.microsoft.com/office/powerpoint/2010/main" val="4115640027"/>
+      </p:ext>
+    </p:extLst>
+  </p:cSld>
+  <p:clrMapOvr>
+    <a:masterClrMapping/>
+  </p:clrMapOvr>
+  <p:timing>
+    <p:tnLst>
+      <p:par>
+        <p:cTn id="1" dur="indefinite" restart="never" nodeType="tmRoot"/>
+      </p:par>
+    </p:tnLst>
+  </p:timing>
+</p:sld>
+</file>
+
+<file path=ppt/slides/slide12.xml><?xml version="1.0" encoding="utf-8"?>
+<p:sld xmlns:a="http://schemas.openxmlformats.org/drawingml/2006/main" xmlns:r="http://schemas.openxmlformats.org/officeDocument/2006/relationships" xmlns:p="http://schemas.openxmlformats.org/presentationml/2006/main">
+  <p:cSld>
+    <p:spTree>
+      <p:nvGrpSpPr>
+        <p:cNvPr id="1" name=""/>
+        <p:cNvGrpSpPr/>
+        <p:nvPr/>
+      </p:nvGrpSpPr>
+      <p:grpSpPr>
+        <a:xfrm>
+          <a:off x="0" y="0"/>
+          <a:ext cx="0" cy="0"/>
+          <a:chOff x="0" y="0"/>
+          <a:chExt cx="0" cy="0"/>
+        </a:xfrm>
+      </p:grpSpPr>
+      <p:sp>
+        <p:nvSpPr>
+          <p:cNvPr id="2" name="Title 1"/>
+          <p:cNvSpPr>
+            <a:spLocks noGrp="1"/>
+          </p:cNvSpPr>
+          <p:nvPr>
+            <p:ph type="title"/>
+          </p:nvPr>
+        </p:nvSpPr>
+        <p:spPr/>
+        <p:txBody>
+          <a:bodyPr/>
+          <a:lstStyle/>
+          <a:p>
+            <a:r>
+              <a:rPr lang="en-US" dirty="0"/>
+              <a:t>Branching Strategy (Advanced)</a:t>
+            </a:r>
+            <a:endParaRPr lang="en-SG" dirty="0"/>
+          </a:p>
+        </p:txBody>
+      </p:sp>
+      <p:sp>
+        <p:nvSpPr>
+          <p:cNvPr id="3" name="Content Placeholder 2"/>
+          <p:cNvSpPr>
+            <a:spLocks noGrp="1"/>
+          </p:cNvSpPr>
+          <p:nvPr>
+            <p:ph idx="1"/>
+          </p:nvPr>
+        </p:nvSpPr>
+        <p:spPr/>
+        <p:txBody>
+          <a:bodyPr/>
+          <a:lstStyle/>
+          <a:p>
+            <a:pPr marL="0" indent="0">
+              <a:buNone/>
+            </a:pPr>
+            <a:r>
+              <a:rPr lang="en-US" dirty="0" smtClean="0"/>
+              <a:t>Note that while you had that bug, it didn't affect or disrupt anyone else's work. This is how this strategy works. Imagine if all of you had worked </a:t>
+            </a:r>
+            <a:r>
+              <a:rPr lang="en-US" dirty="0" smtClean="0"/>
+              <a:t>on the develop branch together. The bugs of one feature might have affected another feature. With this strategy, </a:t>
+            </a:r>
+            <a:r>
+              <a:rPr lang="en-US" smtClean="0"/>
+              <a:t>most of the </a:t>
+            </a:r>
+            <a:r>
+              <a:rPr lang="en-US" dirty="0" smtClean="0"/>
+              <a:t>bugs are isolated and can be fixed before integrated with the rest of the stable code.</a:t>
+            </a:r>
+            <a:endParaRPr lang="en-SG" dirty="0"/>
+          </a:p>
+        </p:txBody>
+      </p:sp>
+    </p:spTree>
+    <p:extLst>
+      <p:ext uri="{BB962C8B-B14F-4D97-AF65-F5344CB8AC3E}">
+        <p14:creationId xmlns:p14="http://schemas.microsoft.com/office/powerpoint/2010/main" val="2089990716"/>
+      </p:ext>
+    </p:extLst>
+  </p:cSld>
+  <p:clrMapOvr>
+    <a:masterClrMapping/>
+  </p:clrMapOvr>
+  <p:timing>
+    <p:tnLst>
+      <p:par>
+        <p:cTn id="1" dur="indefinite" restart="never" nodeType="tmRoot"/>
+      </p:par>
+    </p:tnLst>
+  </p:timing>
+</p:sld>
+</file>
+
+<file path=ppt/slides/slide13.xml><?xml version="1.0" encoding="utf-8"?>
+<p:sld xmlns:a="http://schemas.openxmlformats.org/drawingml/2006/main" xmlns:r="http://schemas.openxmlformats.org/officeDocument/2006/relationships" xmlns:p="http://schemas.openxmlformats.org/presentationml/2006/main">
+  <p:cSld>
+    <p:spTree>
+      <p:nvGrpSpPr>
+        <p:cNvPr id="1" name=""/>
+        <p:cNvGrpSpPr/>
+        <p:nvPr/>
+      </p:nvGrpSpPr>
+      <p:grpSpPr>
+        <a:xfrm>
+          <a:off x="0" y="0"/>
+          <a:ext cx="0" cy="0"/>
+          <a:chOff x="0" y="0"/>
+          <a:chExt cx="0" cy="0"/>
+        </a:xfrm>
+      </p:grpSpPr>
+      <p:sp>
+        <p:nvSpPr>
+          <p:cNvPr id="2" name="Title 1"/>
+          <p:cNvSpPr>
+            <a:spLocks noGrp="1"/>
+          </p:cNvSpPr>
+          <p:nvPr>
+            <p:ph type="title"/>
+          </p:nvPr>
+        </p:nvSpPr>
+        <p:spPr/>
+        <p:txBody>
+          <a:bodyPr/>
+          <a:lstStyle/>
+          <a:p>
+            <a:r>
+              <a:rPr lang="en-US" dirty="0"/>
+              <a:t>Branching Strategy (Advanced)</a:t>
+            </a:r>
+            <a:endParaRPr lang="en-SG" dirty="0"/>
+          </a:p>
+        </p:txBody>
+      </p:sp>
+      <p:sp>
+        <p:nvSpPr>
+          <p:cNvPr id="3" name="Content Placeholder 2"/>
+          <p:cNvSpPr>
+            <a:spLocks noGrp="1"/>
+          </p:cNvSpPr>
+          <p:nvPr>
+            <p:ph idx="1"/>
+          </p:nvPr>
+        </p:nvSpPr>
+        <p:spPr/>
+        <p:txBody>
+          <a:bodyPr/>
+          <a:lstStyle/>
+          <a:p>
+            <a:pPr marL="0" indent="0">
+              <a:buNone/>
+            </a:pPr>
+            <a:endParaRPr lang="en-SG" dirty="0"/>
+          </a:p>
+        </p:txBody>
+      </p:sp>
+    </p:spTree>
+    <p:extLst>
+      <p:ext uri="{BB962C8B-B14F-4D97-AF65-F5344CB8AC3E}">
+        <p14:creationId xmlns:p14="http://schemas.microsoft.com/office/powerpoint/2010/main" val="3876486690"/>
+      </p:ext>
+    </p:extLst>
+  </p:cSld>
+  <p:clrMapOvr>
+    <a:masterClrMapping/>
+  </p:clrMapOvr>
+  <p:timing>
+    <p:tnLst>
+      <p:par>
+        <p:cTn id="1" dur="indefinite" restart="never" nodeType="tmRoot"/>
+      </p:par>
+    </p:tnLst>
+  </p:timing>
+</p:sld>
+</file>
+
 <file path=ppt/slides/slide2.xml><?xml version="1.0" encoding="utf-8"?>
 <p:sld xmlns:a="http://schemas.openxmlformats.org/drawingml/2006/main" xmlns:r="http://schemas.openxmlformats.org/officeDocument/2006/relationships" xmlns:p="http://schemas.openxmlformats.org/presentationml/2006/main">
   <p:cSld>
@@ -3765,7 +4142,14 @@
           <a:bodyPr/>
           <a:lstStyle/>
           <a:p>
-            <a:endParaRPr lang="en-SG"/>
+            <a:pPr marL="0" indent="0">
+              <a:buNone/>
+            </a:pPr>
+            <a:r>
+              <a:rPr lang="en-US" dirty="0" smtClean="0"/>
+              <a:t>If you're confused right about now, perfect. We're going to go through an example to walk through the parts you'll most likely face when working together in a group.</a:t>
+            </a:r>
+            <a:endParaRPr lang="en-SG" dirty="0"/>
           </a:p>
         </p:txBody>
       </p:sp>
@@ -3773,6 +4157,120 @@
     <p:extLst>
       <p:ext uri="{BB962C8B-B14F-4D97-AF65-F5344CB8AC3E}">
         <p14:creationId xmlns:p14="http://schemas.microsoft.com/office/powerpoint/2010/main" val="2446357748"/>
+      </p:ext>
+    </p:extLst>
+  </p:cSld>
+  <p:clrMapOvr>
+    <a:masterClrMapping/>
+  </p:clrMapOvr>
+  <p:timing>
+    <p:tnLst>
+      <p:par>
+        <p:cTn id="1" dur="indefinite" restart="never" nodeType="tmRoot"/>
+      </p:par>
+    </p:tnLst>
+  </p:timing>
+</p:sld>
+</file>
+
+<file path=ppt/slides/slide9.xml><?xml version="1.0" encoding="utf-8"?>
+<p:sld xmlns:a="http://schemas.openxmlformats.org/drawingml/2006/main" xmlns:r="http://schemas.openxmlformats.org/officeDocument/2006/relationships" xmlns:p="http://schemas.openxmlformats.org/presentationml/2006/main">
+  <p:cSld>
+    <p:spTree>
+      <p:nvGrpSpPr>
+        <p:cNvPr id="1" name=""/>
+        <p:cNvGrpSpPr/>
+        <p:nvPr/>
+      </p:nvGrpSpPr>
+      <p:grpSpPr>
+        <a:xfrm>
+          <a:off x="0" y="0"/>
+          <a:ext cx="0" cy="0"/>
+          <a:chOff x="0" y="0"/>
+          <a:chExt cx="0" cy="0"/>
+        </a:xfrm>
+      </p:grpSpPr>
+      <p:sp>
+        <p:nvSpPr>
+          <p:cNvPr id="2" name="Title 1"/>
+          <p:cNvSpPr>
+            <a:spLocks noGrp="1"/>
+          </p:cNvSpPr>
+          <p:nvPr>
+            <p:ph type="title"/>
+          </p:nvPr>
+        </p:nvSpPr>
+        <p:spPr/>
+        <p:txBody>
+          <a:bodyPr/>
+          <a:lstStyle/>
+          <a:p>
+            <a:r>
+              <a:rPr lang="en-US" dirty="0"/>
+              <a:t>Branching Strategy (Advanced)</a:t>
+            </a:r>
+            <a:endParaRPr lang="en-SG" dirty="0"/>
+          </a:p>
+        </p:txBody>
+      </p:sp>
+      <p:sp>
+        <p:nvSpPr>
+          <p:cNvPr id="3" name="Content Placeholder 2"/>
+          <p:cNvSpPr>
+            <a:spLocks noGrp="1"/>
+          </p:cNvSpPr>
+          <p:nvPr>
+            <p:ph idx="1"/>
+          </p:nvPr>
+        </p:nvSpPr>
+        <p:spPr>
+          <a:xfrm>
+            <a:off x="457200" y="1600200"/>
+            <a:ext cx="8229600" cy="5069160"/>
+          </a:xfrm>
+        </p:spPr>
+        <p:txBody>
+          <a:bodyPr>
+            <a:normAutofit/>
+          </a:bodyPr>
+          <a:lstStyle/>
+          <a:p>
+            <a:pPr marL="0" indent="0">
+              <a:buNone/>
+            </a:pPr>
+            <a:r>
+              <a:rPr lang="en-US" dirty="0" smtClean="0"/>
+              <a:t>Let's say you have a group of 5 members, including you, and you have to build a website. Great, everyone </a:t>
+            </a:r>
+            <a:r>
+              <a:rPr lang="en-US" dirty="0" err="1" smtClean="0"/>
+              <a:t>git</a:t>
+            </a:r>
+            <a:r>
+              <a:rPr lang="en-US" dirty="0" smtClean="0"/>
+              <a:t> </a:t>
+            </a:r>
+            <a:r>
+              <a:rPr lang="en-US" dirty="0" err="1" smtClean="0"/>
+              <a:t>inits</a:t>
+            </a:r>
+            <a:r>
+              <a:rPr lang="en-US" dirty="0" smtClean="0"/>
+              <a:t> on their local machine and links it to the server repository. A master and develop branch are created, and everyone is then given a feature to work on. They branch off from the develop branch. You're assigned the login feature, for example. The others work on different features, such as the layout of the news feed pages and the profile page.</a:t>
+            </a:r>
+          </a:p>
+          <a:p>
+            <a:pPr marL="0" indent="0">
+              <a:buNone/>
+            </a:pPr>
+            <a:endParaRPr lang="en-SG" dirty="0"/>
+          </a:p>
+        </p:txBody>
+      </p:sp>
+    </p:spTree>
+    <p:extLst>
+      <p:ext uri="{BB962C8B-B14F-4D97-AF65-F5344CB8AC3E}">
+        <p14:creationId xmlns:p14="http://schemas.microsoft.com/office/powerpoint/2010/main" val="281242029"/>
       </p:ext>
     </p:extLst>
   </p:cSld>

</xml_diff>